<commit_message>
added gpu programming advert slide
</commit_message>
<xml_diff>
--- a/opencl.pptx
+++ b/opencl.pptx
@@ -5,7 +5,7 @@
     <p:sldMasterId id="2147483660" r:id="rId1"/>
   </p:sldMasterIdLst>
   <p:notesMasterIdLst>
-    <p:notesMasterId r:id="rId26"/>
+    <p:notesMasterId r:id="rId28"/>
   </p:notesMasterIdLst>
   <p:sldIdLst>
     <p:sldId id="256" r:id="rId2"/>
@@ -28,10 +28,12 @@
     <p:sldId id="273" r:id="rId19"/>
     <p:sldId id="267" r:id="rId20"/>
     <p:sldId id="278" r:id="rId21"/>
-    <p:sldId id="280" r:id="rId22"/>
-    <p:sldId id="277" r:id="rId23"/>
-    <p:sldId id="279" r:id="rId24"/>
-    <p:sldId id="263" r:id="rId25"/>
+    <p:sldId id="285" r:id="rId22"/>
+    <p:sldId id="280" r:id="rId23"/>
+    <p:sldId id="284" r:id="rId24"/>
+    <p:sldId id="277" r:id="rId25"/>
+    <p:sldId id="279" r:id="rId26"/>
+    <p:sldId id="263" r:id="rId27"/>
   </p:sldIdLst>
   <p:sldSz cx="9144000" cy="6858000" type="screen4x3"/>
   <p:notesSz cx="6858000" cy="9144000"/>
@@ -216,7 +218,7 @@
             <a:fld id="{A27D45CF-A011-43DD-885F-31A033604326}" type="datetimeFigureOut">
               <a:rPr lang="de-DE" smtClean="0"/>
               <a:pPr/>
-              <a:t>10.07.2013</a:t>
+              <a:t>11.07.2013</a:t>
             </a:fld>
             <a:endParaRPr lang="de-DE"/>
           </a:p>
@@ -893,7 +895,7 @@
             <a:fld id="{8B94B43A-7F12-410F-BE58-E05093459609}" type="slidenum">
               <a:rPr lang="de-DE" smtClean="0"/>
               <a:pPr/>
-              <a:t>24</a:t>
+              <a:t>26</a:t>
             </a:fld>
             <a:endParaRPr lang="de-DE"/>
           </a:p>
@@ -3722,7 +3724,6 @@
               <a:rPr lang="en-US" dirty="0" smtClean="0"/>
               <a:t>CPUs, GPUs</a:t>
             </a:r>
-            <a:endParaRPr lang="en-US" dirty="0" smtClean="0"/>
           </a:p>
           <a:p>
             <a:pPr marL="342900" indent="-342900">
@@ -3777,17 +3778,8 @@
             </a:pPr>
             <a:r>
               <a:rPr lang="en-US" dirty="0" smtClean="0"/>
-              <a:t>CPUs, GPUs</a:t>
-            </a:r>
-            <a:r>
-              <a:rPr lang="en-US" dirty="0" smtClean="0"/>
-              <a:t>, </a:t>
-            </a:r>
-            <a:r>
-              <a:rPr lang="en-US" dirty="0" smtClean="0"/>
-              <a:t>APUs</a:t>
-            </a:r>
-            <a:endParaRPr lang="en-US" dirty="0" smtClean="0"/>
+              <a:t>CPUs, GPUs, APUs</a:t>
+            </a:r>
           </a:p>
           <a:p>
             <a:pPr marL="342900" indent="-342900">
@@ -5501,59 +5493,6 @@
               <a:buFont typeface="Arial" pitchFamily="34" charset="0"/>
               <a:buChar char="•"/>
             </a:pPr>
-            <a:r>
-              <a:rPr lang="de-DE" dirty="0" smtClean="0">
-                <a:solidFill>
-                  <a:schemeClr val="tx1"/>
-                </a:solidFill>
-              </a:rPr>
-              <a:t>Lässt sich separieren in vertikalen &amp;</a:t>
-            </a:r>
-            <a:br>
-              <a:rPr lang="de-DE" dirty="0" smtClean="0">
-                <a:solidFill>
-                  <a:schemeClr val="tx1"/>
-                </a:solidFill>
-              </a:rPr>
-            </a:br>
-            <a:r>
-              <a:rPr lang="de-DE" dirty="0" smtClean="0">
-                <a:solidFill>
-                  <a:schemeClr val="tx1"/>
-                </a:solidFill>
-              </a:rPr>
-              <a:t>horizontalen </a:t>
-            </a:r>
-            <a:r>
-              <a:rPr lang="de-DE" dirty="0" err="1" smtClean="0">
-                <a:solidFill>
-                  <a:schemeClr val="tx1"/>
-                </a:solidFill>
-              </a:rPr>
-              <a:t>Blur</a:t>
-            </a:r>
-            <a:endParaRPr lang="de-DE" dirty="0" smtClean="0">
-              <a:solidFill>
-                <a:schemeClr val="tx1"/>
-              </a:solidFill>
-            </a:endParaRPr>
-          </a:p>
-          <a:p>
-            <a:pPr marL="973138" lvl="1" indent="-342900">
-              <a:buFont typeface="Arial" pitchFamily="34" charset="0"/>
-              <a:buChar char="•"/>
-            </a:pPr>
-            <a:r>
-              <a:rPr lang="de-DE" dirty="0" smtClean="0"/>
-              <a:t>Dies reduziert die Zahl der</a:t>
-            </a:r>
-            <a:br>
-              <a:rPr lang="de-DE" dirty="0" smtClean="0"/>
-            </a:br>
-            <a:r>
-              <a:rPr lang="de-DE" dirty="0" smtClean="0"/>
-              <a:t>Lesezugriffe dramatisch!</a:t>
-            </a:r>
             <a:endParaRPr lang="de-DE" dirty="0" smtClean="0">
               <a:solidFill>
                 <a:schemeClr val="tx1"/>
@@ -5571,11 +5510,29 @@
               </a:solidFill>
             </a:endParaRPr>
           </a:p>
+          <a:p>
+            <a:pPr marL="342900" indent="-342900">
+              <a:buFont typeface="Arial" pitchFamily="34" charset="0"/>
+              <a:buChar char="•"/>
+            </a:pPr>
+            <a:endParaRPr lang="de-DE" dirty="0" smtClean="0">
+              <a:solidFill>
+                <a:schemeClr val="tx1"/>
+              </a:solidFill>
+            </a:endParaRPr>
+          </a:p>
+          <a:p>
+            <a:endParaRPr lang="de-DE" dirty="0">
+              <a:solidFill>
+                <a:schemeClr val="tx1"/>
+              </a:solidFill>
+            </a:endParaRPr>
+          </a:p>
         </p:txBody>
       </p:sp>
       <p:pic>
         <p:nvPicPr>
-          <p:cNvPr id="2052" name="Picture 4" descr="http://upload.wikimedia.org/wikipedia/commons/thumb/d/d7/Halftone,_Gaussian_Blur.jpg/220px-Halftone,_Gaussian_Blur.jpg"/>
+          <p:cNvPr id="2056" name="Picture 8" descr="http://media.4teachers.de/images/thumbs/image_thumb.2589.png"/>
           <p:cNvPicPr>
             <a:picLocks noChangeAspect="1" noChangeArrowheads="1"/>
           </p:cNvPicPr>
@@ -5596,8 +5553,8 @@
         </p:blipFill>
         <p:spPr bwMode="auto">
           <a:xfrm>
-            <a:off x="6258316" y="2348880"/>
-            <a:ext cx="2209384" cy="3384376"/>
+            <a:off x="1475656" y="2924944"/>
+            <a:ext cx="4197663" cy="2592288"/>
           </a:xfrm>
           <a:prstGeom prst="rect">
             <a:avLst/>
@@ -5616,7 +5573,7 @@
       </p:pic>
       <p:pic>
         <p:nvPicPr>
-          <p:cNvPr id="2056" name="Picture 8" descr="http://media.4teachers.de/images/thumbs/image_thumb.2589.png"/>
+          <p:cNvPr id="7" name="Picture 4" descr="http://upload.wikimedia.org/wikipedia/commons/thumb/d/d7/Halftone,_Gaussian_Blur.jpg/220px-Halftone,_Gaussian_Blur.jpg"/>
           <p:cNvPicPr>
             <a:picLocks noChangeAspect="1" noChangeArrowheads="1"/>
           </p:cNvPicPr>
@@ -5637,8 +5594,8 @@
         </p:blipFill>
         <p:spPr bwMode="auto">
           <a:xfrm>
-            <a:off x="1622596" y="4005064"/>
-            <a:ext cx="3381452" cy="2088232"/>
+            <a:off x="6611088" y="2348880"/>
+            <a:ext cx="2209384" cy="3384376"/>
           </a:xfrm>
           <a:prstGeom prst="rect">
             <a:avLst/>
@@ -5709,6 +5666,304 @@
           <a:p>
             <a:r>
               <a:rPr lang="en-US" dirty="0" smtClean="0"/>
+              <a:t>Unser </a:t>
+            </a:r>
+            <a:r>
+              <a:rPr lang="en-US" dirty="0" err="1" smtClean="0"/>
+              <a:t>Beispiel</a:t>
+            </a:r>
+            <a:r>
+              <a:rPr lang="en-US" dirty="0" smtClean="0"/>
+              <a:t>: Gaussian Blur</a:t>
+            </a:r>
+            <a:endParaRPr lang="de-DE" dirty="0"/>
+          </a:p>
+        </p:txBody>
+      </p:sp>
+      <p:sp>
+        <p:nvSpPr>
+          <p:cNvPr id="3" name="Inhaltsplatzhalter 2"/>
+          <p:cNvSpPr>
+            <a:spLocks noGrp="1"/>
+          </p:cNvSpPr>
+          <p:nvPr>
+            <p:ph idx="1"/>
+          </p:nvPr>
+        </p:nvSpPr>
+        <p:spPr/>
+        <p:txBody>
+          <a:bodyPr/>
+          <a:lstStyle/>
+          <a:p>
+            <a:r>
+              <a:rPr lang="de-DE" dirty="0" smtClean="0"/>
+              <a:t>In jedem Pixel gewichtete Summe der Umliegenden </a:t>
+            </a:r>
+            <a:r>
+              <a:rPr lang="de-DE" dirty="0" smtClean="0"/>
+              <a:t>bilden</a:t>
+            </a:r>
+            <a:endParaRPr lang="de-DE" dirty="0" smtClean="0">
+              <a:solidFill>
+                <a:schemeClr val="tx1"/>
+              </a:solidFill>
+            </a:endParaRPr>
+          </a:p>
+          <a:p>
+            <a:pPr marL="342900" indent="-342900">
+              <a:buFont typeface="Arial" pitchFamily="34" charset="0"/>
+              <a:buChar char="•"/>
+            </a:pPr>
+            <a:r>
+              <a:rPr lang="de-DE" dirty="0" smtClean="0">
+                <a:solidFill>
+                  <a:schemeClr val="tx1"/>
+                </a:solidFill>
+              </a:rPr>
+              <a:t>Lässt </a:t>
+            </a:r>
+            <a:r>
+              <a:rPr lang="de-DE" dirty="0" smtClean="0">
+                <a:solidFill>
+                  <a:schemeClr val="tx1"/>
+                </a:solidFill>
+              </a:rPr>
+              <a:t>sich separieren in vertikalen &amp;</a:t>
+            </a:r>
+            <a:br>
+              <a:rPr lang="de-DE" dirty="0" smtClean="0">
+                <a:solidFill>
+                  <a:schemeClr val="tx1"/>
+                </a:solidFill>
+              </a:rPr>
+            </a:br>
+            <a:r>
+              <a:rPr lang="de-DE" dirty="0" smtClean="0">
+                <a:solidFill>
+                  <a:schemeClr val="tx1"/>
+                </a:solidFill>
+              </a:rPr>
+              <a:t>horizontalen </a:t>
+            </a:r>
+            <a:r>
+              <a:rPr lang="de-DE" dirty="0" err="1" smtClean="0">
+                <a:solidFill>
+                  <a:schemeClr val="tx1"/>
+                </a:solidFill>
+              </a:rPr>
+              <a:t>Blur</a:t>
+            </a:r>
+            <a:endParaRPr lang="de-DE" dirty="0" smtClean="0">
+              <a:solidFill>
+                <a:schemeClr val="tx1"/>
+              </a:solidFill>
+            </a:endParaRPr>
+          </a:p>
+          <a:p>
+            <a:pPr marL="973138" lvl="1" indent="-342900">
+              <a:buFont typeface="Arial" pitchFamily="34" charset="0"/>
+              <a:buChar char="•"/>
+            </a:pPr>
+            <a:r>
+              <a:rPr lang="de-DE" dirty="0" smtClean="0"/>
+              <a:t>reduziert Zahl der Lesezugriffe </a:t>
+            </a:r>
+            <a:r>
+              <a:rPr lang="de-DE" dirty="0" smtClean="0"/>
+              <a:t>dramatisch!</a:t>
+            </a:r>
+            <a:endParaRPr lang="de-DE" dirty="0" smtClean="0">
+              <a:solidFill>
+                <a:schemeClr val="tx1"/>
+              </a:solidFill>
+            </a:endParaRPr>
+          </a:p>
+          <a:p>
+            <a:pPr marL="342900" indent="-342900">
+              <a:buFont typeface="Arial" pitchFamily="34" charset="0"/>
+              <a:buChar char="•"/>
+            </a:pPr>
+            <a:endParaRPr lang="de-DE" dirty="0">
+              <a:solidFill>
+                <a:schemeClr val="tx1"/>
+              </a:solidFill>
+            </a:endParaRPr>
+          </a:p>
+        </p:txBody>
+      </p:sp>
+      <p:pic>
+        <p:nvPicPr>
+          <p:cNvPr id="2052" name="Picture 4" descr="http://upload.wikimedia.org/wikipedia/commons/thumb/d/d7/Halftone,_Gaussian_Blur.jpg/220px-Halftone,_Gaussian_Blur.jpg"/>
+          <p:cNvPicPr>
+            <a:picLocks noChangeAspect="1" noChangeArrowheads="1"/>
+          </p:cNvPicPr>
+          <p:nvPr/>
+        </p:nvPicPr>
+        <p:blipFill>
+          <a:blip r:embed="rId2">
+            <a:extLst>
+              <a:ext uri="{28A0092B-C50C-407E-A947-70E740481C1C}">
+                <a14:useLocalDpi xmlns:a14="http://schemas.microsoft.com/office/drawing/2010/main" val="0"/>
+              </a:ext>
+            </a:extLst>
+          </a:blip>
+          <a:srcRect/>
+          <a:stretch>
+            <a:fillRect/>
+          </a:stretch>
+        </p:blipFill>
+        <p:spPr bwMode="auto">
+          <a:xfrm>
+            <a:off x="6611088" y="2348880"/>
+            <a:ext cx="2209384" cy="3384376"/>
+          </a:xfrm>
+          <a:prstGeom prst="rect">
+            <a:avLst/>
+          </a:prstGeom>
+          <a:noFill/>
+          <a:extLst>
+            <a:ext uri="{909E8E84-426E-40DD-AFC4-6F175D3DCCD1}">
+              <a14:hiddenFill xmlns:a14="http://schemas.microsoft.com/office/drawing/2010/main">
+                <a:solidFill>
+                  <a:srgbClr val="FFFFFF"/>
+                </a:solidFill>
+              </a14:hiddenFill>
+            </a:ext>
+          </a:extLst>
+        </p:spPr>
+      </p:pic>
+      <p:pic>
+        <p:nvPicPr>
+          <p:cNvPr id="1026" name="Picture 2" descr="http://www.gamerendering.com/wp-content/uploads/image13-bluring.jpg"/>
+          <p:cNvPicPr>
+            <a:picLocks noChangeAspect="1" noChangeArrowheads="1"/>
+          </p:cNvPicPr>
+          <p:nvPr/>
+        </p:nvPicPr>
+        <p:blipFill rotWithShape="1">
+          <a:blip r:embed="rId3">
+            <a:extLst>
+              <a:ext uri="{28A0092B-C50C-407E-A947-70E740481C1C}">
+                <a14:useLocalDpi xmlns:a14="http://schemas.microsoft.com/office/drawing/2010/main" val="0"/>
+              </a:ext>
+            </a:extLst>
+          </a:blip>
+          <a:srcRect t="1" r="32534" b="46634"/>
+          <a:stretch/>
+        </p:blipFill>
+        <p:spPr bwMode="auto">
+          <a:xfrm>
+            <a:off x="395536" y="3429000"/>
+            <a:ext cx="2817222" cy="2283129"/>
+          </a:xfrm>
+          <a:prstGeom prst="rect">
+            <a:avLst/>
+          </a:prstGeom>
+          <a:noFill/>
+          <a:extLst>
+            <a:ext uri="{909E8E84-426E-40DD-AFC4-6F175D3DCCD1}">
+              <a14:hiddenFill xmlns:a14="http://schemas.microsoft.com/office/drawing/2010/main">
+                <a:solidFill>
+                  <a:srgbClr val="FFFFFF"/>
+                </a:solidFill>
+              </a14:hiddenFill>
+            </a:ext>
+          </a:extLst>
+        </p:spPr>
+      </p:pic>
+      <p:pic>
+        <p:nvPicPr>
+          <p:cNvPr id="7" name="Picture 2" descr="http://www.gamerendering.com/wp-content/uploads/image13-bluring.jpg"/>
+          <p:cNvPicPr>
+            <a:picLocks noChangeAspect="1" noChangeArrowheads="1"/>
+          </p:cNvPicPr>
+          <p:nvPr/>
+        </p:nvPicPr>
+        <p:blipFill rotWithShape="1">
+          <a:blip r:embed="rId3">
+            <a:extLst>
+              <a:ext uri="{28A0092B-C50C-407E-A947-70E740481C1C}">
+                <a14:useLocalDpi xmlns:a14="http://schemas.microsoft.com/office/drawing/2010/main" val="0"/>
+              </a:ext>
+            </a:extLst>
+          </a:blip>
+          <a:srcRect t="53482" r="32534" b="9384"/>
+          <a:stretch/>
+        </p:blipFill>
+        <p:spPr bwMode="auto">
+          <a:xfrm>
+            <a:off x="3275855" y="3614264"/>
+            <a:ext cx="2817223" cy="1588699"/>
+          </a:xfrm>
+          <a:prstGeom prst="rect">
+            <a:avLst/>
+          </a:prstGeom>
+          <a:noFill/>
+          <a:extLst>
+            <a:ext uri="{909E8E84-426E-40DD-AFC4-6F175D3DCCD1}">
+              <a14:hiddenFill xmlns:a14="http://schemas.microsoft.com/office/drawing/2010/main">
+                <a:solidFill>
+                  <a:srgbClr val="FFFFFF"/>
+                </a:solidFill>
+              </a14:hiddenFill>
+            </a:ext>
+          </a:extLst>
+        </p:spPr>
+      </p:pic>
+    </p:spTree>
+    <p:extLst>
+      <p:ext uri="{BB962C8B-B14F-4D97-AF65-F5344CB8AC3E}">
+        <p14:creationId xmlns:p14="http://schemas.microsoft.com/office/powerpoint/2010/main" val="2973711236"/>
+      </p:ext>
+    </p:extLst>
+  </p:cSld>
+  <p:clrMapOvr>
+    <a:masterClrMapping/>
+  </p:clrMapOvr>
+  <p:timing>
+    <p:tnLst>
+      <p:par>
+        <p:cTn id="1" dur="indefinite" restart="never" nodeType="tmRoot"/>
+      </p:par>
+    </p:tnLst>
+  </p:timing>
+</p:sld>
+</file>
+
+<file path=ppt/slides/slide22.xml><?xml version="1.0" encoding="utf-8"?>
+<p:sld xmlns:a="http://schemas.openxmlformats.org/drawingml/2006/main" xmlns:r="http://schemas.openxmlformats.org/officeDocument/2006/relationships" xmlns:p="http://schemas.openxmlformats.org/presentationml/2006/main">
+  <p:cSld>
+    <p:spTree>
+      <p:nvGrpSpPr>
+        <p:cNvPr id="1" name=""/>
+        <p:cNvGrpSpPr/>
+        <p:nvPr/>
+      </p:nvGrpSpPr>
+      <p:grpSpPr>
+        <a:xfrm>
+          <a:off x="0" y="0"/>
+          <a:ext cx="0" cy="0"/>
+          <a:chOff x="0" y="0"/>
+          <a:chExt cx="0" cy="0"/>
+        </a:xfrm>
+      </p:grpSpPr>
+      <p:sp>
+        <p:nvSpPr>
+          <p:cNvPr id="2" name="Titel 1"/>
+          <p:cNvSpPr>
+            <a:spLocks noGrp="1"/>
+          </p:cNvSpPr>
+          <p:nvPr>
+            <p:ph type="title"/>
+          </p:nvPr>
+        </p:nvSpPr>
+        <p:spPr/>
+        <p:txBody>
+          <a:bodyPr/>
+          <a:lstStyle/>
+          <a:p>
+            <a:r>
+              <a:rPr lang="en-US" dirty="0" smtClean="0"/>
               <a:t>Gaussian Blur </a:t>
             </a:r>
             <a:r>
@@ -5952,7 +6207,205 @@
 </p:sld>
 </file>
 
-<file path=ppt/slides/slide22.xml><?xml version="1.0" encoding="utf-8"?>
+<file path=ppt/slides/slide23.xml><?xml version="1.0" encoding="utf-8"?>
+<p:sld xmlns:a="http://schemas.openxmlformats.org/drawingml/2006/main" xmlns:r="http://schemas.openxmlformats.org/officeDocument/2006/relationships" xmlns:p="http://schemas.openxmlformats.org/presentationml/2006/main">
+  <p:cSld>
+    <p:spTree>
+      <p:nvGrpSpPr>
+        <p:cNvPr id="1" name=""/>
+        <p:cNvGrpSpPr/>
+        <p:nvPr/>
+      </p:nvGrpSpPr>
+      <p:grpSpPr>
+        <a:xfrm>
+          <a:off x="0" y="0"/>
+          <a:ext cx="0" cy="0"/>
+          <a:chOff x="0" y="0"/>
+          <a:chExt cx="0" cy="0"/>
+        </a:xfrm>
+      </p:grpSpPr>
+      <p:sp>
+        <p:nvSpPr>
+          <p:cNvPr id="2" name="Titel 1"/>
+          <p:cNvSpPr>
+            <a:spLocks noGrp="1"/>
+          </p:cNvSpPr>
+          <p:nvPr>
+            <p:ph type="title"/>
+          </p:nvPr>
+        </p:nvSpPr>
+        <p:spPr/>
+        <p:txBody>
+          <a:bodyPr/>
+          <a:lstStyle/>
+          <a:p>
+            <a:r>
+              <a:rPr lang="en-US" dirty="0" err="1" smtClean="0"/>
+              <a:t>Mehr</a:t>
+            </a:r>
+            <a:r>
+              <a:rPr lang="en-US" dirty="0" smtClean="0"/>
+              <a:t>?</a:t>
+            </a:r>
+            <a:endParaRPr lang="de-DE" dirty="0"/>
+          </a:p>
+        </p:txBody>
+      </p:sp>
+      <p:sp>
+        <p:nvSpPr>
+          <p:cNvPr id="3" name="Inhaltsplatzhalter 2"/>
+          <p:cNvSpPr>
+            <a:spLocks noGrp="1"/>
+          </p:cNvSpPr>
+          <p:nvPr>
+            <p:ph idx="1"/>
+          </p:nvPr>
+        </p:nvSpPr>
+        <p:spPr/>
+        <p:txBody>
+          <a:bodyPr/>
+          <a:lstStyle/>
+          <a:p>
+            <a:endParaRPr lang="en-US" dirty="0" smtClean="0">
+              <a:solidFill>
+                <a:schemeClr val="tx1"/>
+              </a:solidFill>
+            </a:endParaRPr>
+          </a:p>
+          <a:p>
+            <a:endParaRPr lang="en-US" dirty="0">
+              <a:solidFill>
+                <a:schemeClr val="tx1"/>
+              </a:solidFill>
+            </a:endParaRPr>
+          </a:p>
+          <a:p>
+            <a:endParaRPr lang="en-US" dirty="0" smtClean="0">
+              <a:solidFill>
+                <a:schemeClr val="tx1"/>
+              </a:solidFill>
+            </a:endParaRPr>
+          </a:p>
+          <a:p>
+            <a:r>
+              <a:rPr lang="en-US" sz="6000" dirty="0" smtClean="0"/>
+              <a:t>GPU-</a:t>
+            </a:r>
+            <a:r>
+              <a:rPr lang="en-US" sz="6000" dirty="0" err="1" smtClean="0"/>
+              <a:t>Programmierung</a:t>
+            </a:r>
+            <a:endParaRPr lang="en-US" sz="6000" dirty="0" smtClean="0"/>
+          </a:p>
+          <a:p>
+            <a:r>
+              <a:rPr lang="en-US" dirty="0" smtClean="0">
+                <a:solidFill>
+                  <a:schemeClr val="tx1"/>
+                </a:solidFill>
+              </a:rPr>
+              <a:t>	Prof. Thorsten </a:t>
+            </a:r>
+            <a:r>
+              <a:rPr lang="en-US" dirty="0" err="1" smtClean="0">
+                <a:solidFill>
+                  <a:schemeClr val="tx1"/>
+                </a:solidFill>
+              </a:rPr>
+              <a:t>Grosch</a:t>
+            </a:r>
+            <a:endParaRPr lang="en-US" dirty="0" smtClean="0">
+              <a:solidFill>
+                <a:schemeClr val="tx1"/>
+              </a:solidFill>
+            </a:endParaRPr>
+          </a:p>
+          <a:p>
+            <a:r>
+              <a:rPr lang="en-US" dirty="0">
+                <a:solidFill>
+                  <a:schemeClr val="tx1"/>
+                </a:solidFill>
+              </a:rPr>
+              <a:t>	</a:t>
+            </a:r>
+            <a:r>
+              <a:rPr lang="en-US" dirty="0" err="1" smtClean="0">
+                <a:solidFill>
+                  <a:schemeClr val="tx1"/>
+                </a:solidFill>
+              </a:rPr>
+              <a:t>Jedes</a:t>
+            </a:r>
+            <a:r>
+              <a:rPr lang="en-US" dirty="0" smtClean="0">
+                <a:solidFill>
+                  <a:schemeClr val="tx1"/>
+                </a:solidFill>
+              </a:rPr>
+              <a:t> </a:t>
+            </a:r>
+            <a:r>
+              <a:rPr lang="en-US" dirty="0" err="1" smtClean="0">
+                <a:solidFill>
+                  <a:schemeClr val="tx1"/>
+                </a:solidFill>
+              </a:rPr>
+              <a:t>SoSe</a:t>
+            </a:r>
+            <a:r>
+              <a:rPr lang="en-US" dirty="0" smtClean="0">
+                <a:solidFill>
+                  <a:schemeClr val="tx1"/>
+                </a:solidFill>
+              </a:rPr>
+              <a:t>, </a:t>
+            </a:r>
+            <a:r>
+              <a:rPr lang="en-US" dirty="0" err="1" smtClean="0">
+                <a:solidFill>
+                  <a:schemeClr val="tx1"/>
+                </a:solidFill>
+              </a:rPr>
+              <a:t>Wahlpflichtfach</a:t>
+            </a:r>
+            <a:r>
+              <a:rPr lang="en-US" dirty="0" smtClean="0">
+                <a:solidFill>
+                  <a:schemeClr val="tx1"/>
+                </a:solidFill>
+              </a:rPr>
+              <a:t> Bachelor</a:t>
+            </a:r>
+            <a:endParaRPr lang="de-DE" dirty="0">
+              <a:solidFill>
+                <a:schemeClr val="tx1"/>
+              </a:solidFill>
+            </a:endParaRPr>
+          </a:p>
+        </p:txBody>
+      </p:sp>
+    </p:spTree>
+    <p:extLst>
+      <p:ext uri="{BB962C8B-B14F-4D97-AF65-F5344CB8AC3E}">
+        <p14:creationId xmlns:p14="http://schemas.microsoft.com/office/powerpoint/2010/main" val="4190573513"/>
+      </p:ext>
+    </p:extLst>
+  </p:cSld>
+  <p:clrMapOvr>
+    <a:masterClrMapping/>
+  </p:clrMapOvr>
+  <p:timing>
+    <p:tnLst>
+      <p:par>
+        <p:cTn id="1" dur="indefinite" restart="never" nodeType="tmRoot"/>
+      </p:par>
+    </p:tnLst>
+  </p:timing>
+</p:sld>
+</file>
+
+<file path=ppt/slides/slide24.xml><?xml version="1.0" encoding="utf-8"?>
 <p:sld xmlns:a="http://schemas.openxmlformats.org/drawingml/2006/main" xmlns:r="http://schemas.openxmlformats.org/officeDocument/2006/relationships" xmlns:p="http://schemas.openxmlformats.org/presentationml/2006/main">
   <p:cSld>
     <p:spTree>
@@ -6012,7 +6465,7 @@
 </p:sld>
 </file>
 
-<file path=ppt/slides/slide23.xml><?xml version="1.0" encoding="utf-8"?>
+<file path=ppt/slides/slide25.xml><?xml version="1.0" encoding="utf-8"?>
 <p:sld xmlns:a="http://schemas.openxmlformats.org/drawingml/2006/main" xmlns:r="http://schemas.openxmlformats.org/officeDocument/2006/relationships" xmlns:p="http://schemas.openxmlformats.org/presentationml/2006/main">
   <p:cSld>
     <p:spTree>
@@ -6513,7 +6966,7 @@
 </p:sld>
 </file>
 
-<file path=ppt/slides/slide24.xml><?xml version="1.0" encoding="utf-8"?>
+<file path=ppt/slides/slide26.xml><?xml version="1.0" encoding="utf-8"?>
 <p:sld xmlns:a="http://schemas.openxmlformats.org/drawingml/2006/main" xmlns:r="http://schemas.openxmlformats.org/officeDocument/2006/relationships" xmlns:p="http://schemas.openxmlformats.org/presentationml/2006/main">
   <p:cSld>
     <p:spTree>
@@ -7976,16 +8429,6 @@
                 </a:solidFill>
               </a14:hiddenFill>
             </a:ext>
-            <a:ext uri="{91240B29-F687-4F45-9708-019B960494DF}">
-              <a14:hiddenLine xmlns:a14="http://schemas.microsoft.com/office/drawing/2010/main" w="9525">
-                <a:solidFill>
-                  <a:schemeClr val="tx1"/>
-                </a:solidFill>
-                <a:miter lim="800000"/>
-                <a:headEnd/>
-                <a:tailEnd/>
-              </a14:hiddenLine>
-            </a:ext>
           </a:extLst>
         </p:spPr>
       </p:pic>
@@ -9029,7 +9472,6 @@
               <a:rPr lang="en-US" dirty="0" smtClean="0"/>
               <a:t> (AMD)</a:t>
             </a:r>
-            <a:endParaRPr lang="en-US" dirty="0" smtClean="0"/>
           </a:p>
           <a:p>
             <a:pPr marL="1984375" lvl="3" indent="-342900">

</xml_diff>

<commit_message>
minor changes in slides, using now snapshot version of javacl ran into some problems, solved in the current version..
</commit_message>
<xml_diff>
--- a/opencl.pptx
+++ b/opencl.pptx
@@ -3658,6 +3658,10 @@
               <a:rPr lang="en-US" dirty="0" smtClean="0"/>
               <a:t>Intel</a:t>
             </a:r>
+            <a:r>
+              <a:rPr lang="en-US" dirty="0" smtClean="0"/>
+              <a:t/>
+            </a:r>
             <a:br>
               <a:rPr lang="en-US" dirty="0" smtClean="0"/>
             </a:br>
@@ -3667,13 +3671,23 @@
                   <a:schemeClr val="tx1"/>
                 </a:solidFill>
               </a:rPr>
-              <a:t>“Intel </a:t>
+              <a:t>“</a:t>
+            </a:r>
+            <a:r>
+              <a:rPr lang="en-US" sz="2000" dirty="0" smtClean="0">
+                <a:solidFill>
+                  <a:schemeClr val="tx1"/>
+                </a:solidFill>
+                <a:hlinkClick r:id="rId2"/>
+              </a:rPr>
+              <a:t>Intel </a:t>
             </a:r>
             <a:r>
               <a:rPr lang="en-US" sz="2000" dirty="0">
                 <a:solidFill>
                   <a:schemeClr val="tx1"/>
                 </a:solidFill>
+                <a:hlinkClick r:id="rId2"/>
               </a:rPr>
               <a:t>SDK for </a:t>
             </a:r>
@@ -3682,6 +3696,7 @@
                 <a:solidFill>
                   <a:schemeClr val="tx1"/>
                 </a:solidFill>
+                <a:hlinkClick r:id="rId2"/>
               </a:rPr>
               <a:t>OpenCL</a:t>
             </a:r>
@@ -3690,6 +3705,7 @@
                 <a:solidFill>
                   <a:schemeClr val="tx1"/>
                 </a:solidFill>
+                <a:hlinkClick r:id="rId2"/>
               </a:rPr>
               <a:t> Applications </a:t>
             </a:r>
@@ -3698,8 +3714,17 @@
                 <a:solidFill>
                   <a:schemeClr val="tx1"/>
                 </a:solidFill>
-              </a:rPr>
-              <a:t>2012” </a:t>
+                <a:hlinkClick r:id="rId2"/>
+              </a:rPr>
+              <a:t>2012</a:t>
+            </a:r>
+            <a:r>
+              <a:rPr lang="en-US" sz="2000" dirty="0" smtClean="0">
+                <a:solidFill>
+                  <a:schemeClr val="tx1"/>
+                </a:solidFill>
+              </a:rPr>
+              <a:t>” </a:t>
             </a:r>
             <a:r>
               <a:rPr lang="en-US" sz="2000" dirty="0" err="1" smtClean="0">
@@ -3722,7 +3747,15 @@
             </a:pPr>
             <a:r>
               <a:rPr lang="en-US" dirty="0" smtClean="0"/>
-              <a:t>CPUs, GPUs</a:t>
+              <a:t>CPUs</a:t>
+            </a:r>
+            <a:r>
+              <a:rPr lang="en-US" dirty="0" smtClean="0"/>
+              <a:t>, </a:t>
+            </a:r>
+            <a:r>
+              <a:rPr lang="en-US" dirty="0" smtClean="0"/>
+              <a:t>GPUs</a:t>
             </a:r>
           </a:p>
           <a:p>
@@ -3754,8 +3787,17 @@
                 <a:solidFill>
                   <a:schemeClr val="tx1"/>
                 </a:solidFill>
-              </a:rPr>
-              <a:t>AMD APP SDK” </a:t>
+                <a:hlinkClick r:id="rId3"/>
+              </a:rPr>
+              <a:t>AMD APP SDK</a:t>
+            </a:r>
+            <a:r>
+              <a:rPr lang="en-US" sz="2000" dirty="0" smtClean="0">
+                <a:solidFill>
+                  <a:schemeClr val="tx1"/>
+                </a:solidFill>
+              </a:rPr>
+              <a:t>” </a:t>
             </a:r>
             <a:r>
               <a:rPr lang="en-US" sz="2000" dirty="0" err="1" smtClean="0">
@@ -3778,8 +3820,16 @@
             </a:pPr>
             <a:r>
               <a:rPr lang="en-US" dirty="0" smtClean="0"/>
-              <a:t>CPUs, GPUs, APUs</a:t>
-            </a:r>
+              <a:t>CPUs, GPUs, </a:t>
+            </a:r>
+            <a:r>
+              <a:rPr lang="en-US" dirty="0" smtClean="0"/>
+              <a:t>APUs</a:t>
+            </a:r>
+            <a:br>
+              <a:rPr lang="en-US" dirty="0" smtClean="0"/>
+            </a:br>
+            <a:endParaRPr lang="en-US" dirty="0" smtClean="0"/>
           </a:p>
           <a:p>
             <a:pPr marL="342900" indent="-342900">
@@ -3802,6 +3852,205 @@
           </a:p>
         </p:txBody>
       </p:sp>
+      <p:sp>
+        <p:nvSpPr>
+          <p:cNvPr id="4" name="AutoShape 2" descr="data:image/jpeg;base64,/9j/4AAQSkZJRgABAQAAAQABAAD/2wCEAAkGBxISEhUSExQWFhUWFBgXFRYWFxYVGhcXGRgXFxgYGRYZHSgiGBolHBgXITEhJykrLi8uGB8zODMsNygvLiwBCgoKDg0OGxAQGzIkICYsLC0sLCwsLCwsLCwsNywsNCwsLSwsLCwsLCwsLCwsLCwsLCwsLCwsLCwsLCwsLCwsLP/AABEIALYBFAMBEQACEQEDEQH/xAAcAAEAAgMBAQEAAAAAAAAAAAAABgcEBQgDAQL/xABMEAABAwIBBgYNCQcEAgMAAAABAAIDBBEFBgcSITFRQWFxcoGyEyIyMzRSYnORkqGxwSM1QkNTdIKi0hQXVJOzwtEWRGPhJIMlZNP/xAAaAQEAAwEBAQAAAAAAAAAAAAAAAwQFBgIB/8QAMxEAAQMCAgcHBAIDAQAAAAAAAAECAwQRBSESMTIzQXGBFFFSYZGh0RMiQrEV8CNDweH/2gAMAwEAAhEDEQA/ALxQBAEAQBAEAQBAEAQBAEAQBAEBqsRylo4L9lqI2kbW6Qc71G3PsUrIJH7LVInzxs2nEbrs6NEzVG2WXjDQxvpeQfYrTcPlXXZCs7EIk1XU0NXnZlPeqdjeN7y/2AN96nbhrfycV3Ykv4tNPU5yMQfsexnMjH9+kp20EKcL9SF1fMurLoayfK+vftqpfwkM6oCkSlhT8UI1qpl/IwpMaqnd1UTnllkPvcpEijT8U9EI1mkX8l9TwfWynbI88r3H4r0jGpwPKvcvFT8/tL/Hd6x/ymincNJ3eejMRmGyWQckjx8V8+mzuT0PqSPTivqZUOUVYzuaqcf+15HoJsvKwRLranoeknlTU5fU2VNl7iLP9wXDc9jHe3Rv7VE6jhX8SVKyZOJuaLOrVN75FE8eTpRn03cPYoHYdGupVQmbiL01oikjw7OnSPsJWSRHhNhI0dLe2/Kqz8OkTZVFLLMQjXWioSzC8bpqkXhmY/iDhpDladY6Qqj4ns2ksW2Ssfsrc2CjJAgCAIAgCAIAgCAIAgCAIAgCAIAgPhNtZQEZxjLyhp7jsvZHD6MXb/m7kelWo6OV/C3MrSVcTON+RCsVzqTuuKeJkY8Z95HcoGoD2q9HhzE21uUZMRcuwliI4nlFV1Hfp5HDxdLRb6jbD2K4yCNmy0pvnkftOMWhw2abvUUknMY5w9IGpenSNbtLY8tje7ZS5v6LN9iEn1IYN8j2j2Ak+xV3VsLeN+RYbRTLwsbulzTznvk8bea1z/foqB2JM4NJm4c7i42tPmmgHfKiV3MaxnvDlEuJP4NQmbhzOKqbCDNjQN29lfzpLdUBRLiEy93oSJQQp3+plszeYaPqCeWWb9a8rWz9/sh77FD4fdT3bkJhw/2zfWef7l57ZN4j72SHwnx2QeHH/bN6HSD3OTtk3i/QWjhX8TwkzdYadkLhySy/FxXpK6fv9kPPYoe73UwKjNZRO7l87OIOaR+ZpPtUjcRlTWiKeFw+JdVzU1eaU7YqnkD4/wC5rvgpm4l4m+5C7DfC72I/iGbmvi1hjJR/xvF/Q6xVhldC7WtuZXfQzN1ZkYrKOSF2jLG+N257S09F9qtNc1yXatyq5jmrZyWPJjiCCCQRsI1EchX3WeUW2olWB5wa2nsHP7MzxZdZtxSbb8t+RVJaKJ+pLL5fBbirZGa808yy8m8uKWrswO7FKfq5LC58l2x3v4lmTUkkWetO81IauOTLUvcSdVSyEAQBAEAQBAEAQBAEAQBAY1fXxQMMkr2saOFxAHIN54l6axz1s1Lnlz2tS7lsQDHc6cbbtpI9M/aSXa3lDO6PTorQiw5VzkW3khny4g1MmJcgGK4/WVrtGSR8lzqjbcN4rRt28puVoxwxxJdEt5/+me+aSVbKt/I2WE5v6+ex7GImn6Up0fyC7vSAopK2JnG/IljopX8LcyYYZmphbYzzPefFYAwclzcn2Km/EXLspYuMw5qbS3JTh2SNDBbQp47j6Tx2R3KC+5HQqj6mV+txaZTRM1NN2BbUFATn1AEAQBAEAQBAEAQBAEB5VNMyRpZIxr2na1wDgegr61ytW6KfFajkspDMczZ0st3QEwP3DtmE8bCdXQRyK7FXyNydmnuUpaCN2bcitMoclqqiPyrLsvqlZ2zD0/RPEbLUhqI5dlc+7iZk1O+LaTLvNIpyAnWSGcOWnIiqS6WHYHbZIxy/TbxHXu3KhUULX/czJfYv09a5n2vzT9FvUdUyVjZI3B7HC7XA3BCxnNVq2XWbDXI5Loey+H0IAgCAIAgCAIAgPKpqGRtL5HBjWi5c4gADjJX1Gq5bIfFcjUupXWUudBrbso26R+1eCG/hZtdym3IVpQ4eq5yehnTYgiZR+pD6bCMRxN/ZCHyX+tkOiwDyb6rcTQrjpYadLavJNf8AeZTSKadbrn5rq/vImuC5q4m2dUymQ+JH2jeQu7p3RoqlJiLl2EsXY8Pam2tycYZhEFONGGJkY4dEAE8rtp6VQfI9+bluXmRsZspYzV4PYQBAEAQBAEAQBAEAQBAEAQBAEAQH4lja4FrgC0ixBFwRuIO1fUVUzQ+Kl8lKwy2zdaIdPRg22vg223mP9Po3LUpq6/2yevyZdTRW+6P0+Cs1qGYSfInK19DJY3dA8/KM3eW3yhu4R0EVammSZMtZapqlYlsuovKmnbIxr2ODmuAc1w2EHWCFgqiotlN1FRUuh6r4fQgCAIAgCAIAgIfnByanrv2dkRa1rXPMjnHULhob2o1uPdW6dYVyknbDpK4qVcDptFEP1gGb2jprOe3s8g+lIAWg+THsHTc8aS1sj8kyTyEVFHHmua+ZLQFTLZ9QBAEAQBAEAQBAEAQBAEAQBAEAQBAEAQBAEBV2dDJANDq2Bttd52Dj+sA63p3rVoam/wDjd0+Pgy62m/2N6/JWa1DLLIzS5RlrjRSHtXXdDfgdtczkOtw4wd6zMQgun1E6mnQT/wCtehaqyTVCAIAgCAICvZc6sDXFv7PLqJHdM4DbetFMOeqX0kM9cQYi2splYPnJhqJ44GwyNMjtEElthy2XiSgcxquVUyPcdcx7kaiLmThUS6EAQBAEAQBAEAQBAEAQBAEAQBAEAQBAVnlxlvV0lW+GLsegGsI0mEnW2513WnS0kckek4zaqrfHJotNAc51f/w/yz+pWP4+LzK/8hL5Fx0EpfFG87XMa48pAJWM5LOVDZat0RTSZQ45LG7QhaDZ0bHuIDiXyntGMDnNANtZc42ALdRvqniia5Lu8/biQSyuRbN8vfgfcnccklIbKO6MgY6waQ+J2jJG9oc5pPCHNdYgHULa/k0SNzTy9+PARSq7X5+3DiSCWMOBa4Agggg7CDqIKgRbZoWFS5z1lXg5pKqSD6IOlGd7Ha28ttnKCuip5fqxo71OdqIvpSK30NdSVLonskYbOY4OaeNpuFI5qORUXiRNcrVRUOjsMrWzwxzN7mRjXjpF7LmntVjlavA6Vjkc1HJxMpeT0EAQGrrcehjqIqUm8spNmj6LQ1ztJ24arDf6VK2FzmK/ghE6VrXoziptFESnNFb3x/Pd1iunbsocy/aXmbbIfw+m86PcVDVbl3Impd806BXPHQBAEAQBAEAQBAQTORlTU0T4WwFgD2uLtJulrBaBbXxq/R07JUVXcCjWVD4lTR4kO/eXiG+L+X/2rvYIfP1KXb5fItTJDEZKijhmktpvBLrCw1OcNnIFk1DEZIrU1GrA9Xxo5eJuFCTBAEAQBAEAQBAUfnT+cZOZH1Vu0G5TqYdfvuiERKuFM6TwjvEXmmdULmH7S8zpmbKGlyiwR0jy4M7LE98T5Yu00i6I6raZDXNc2zSCRbRBHCFPDKiJa9lzsvPkQyxqvC6ZXTlzPuTeDyR9jDwWRQ6YgjcWl40z9MsJb2rbtFibgknWk0qOvbNV1r8cxFGqWvkiak+SSKsWCsc8+Hi0FQBru6Jx33Gmz0Wf6VqYa/aZ1MzEWZNf0KwWqZRdeamt06BrSe9SPZr3anj2PCw69lpr95uUL7woncTJUi4EBFsusrm0Mei2zp3jtG8DRs03cW4cJ6bWqWmWZ111IVaqpSFLJrUg2bbDJ6qt/bXuJbG5xe92sve5pbojkBvxCw4VfrZGRxfTTiUaON8kn1F4FxLGNgi8mb/DiSTBrJJPyku06/GVpK2ZOPshVWihVb291PagyIoIZGyxw6L2G7TpyGx5C6xXx9XK9uiq5ckPrKSJjtJqZ81JEqxZCAIAgCAIAgCAqnPT32m5knvatbDdl3QysS1t6lcLTMwvrN183U/Nd13Ln6vfOOgpNy0karFgIAgCAIAgCAICj86fzjJzI+qt2g3KdTDr990QiJVwpnSeEd4i80zqhcw/aXmdMzZQy15PQQBAQ3OzGDh5PiyxkenR+Ku0C/5uilOuT/CvQpRbhhkpyUx408Tmb5C78rR8FTqIdN1/Iu002g23mXosI2zVZTY5HRQOmfrOxjdhe87Gj3niBUsEKyv0UIppUiZpKUfSQ1GJVgBN5JXXc7gY0bTbga0agOQcK3XKyCPyQw2o+ok81L6wrDo6aJkMQsxgsN53k7yTrPKsCR6vcrnG8xiMajUMteD2URVZb4iHvAqXWD3AdrHsBI8Vb7aSGyfb+zCdVzIqppGxyUyvrpayCOSoc5jpAHN0Yxca9Wpt1FUU0TYnKjcySnqZXSI1VyLmWKbJWec7KOrpqmNkExjaYQ4gBhudN4v2wPAAtOhgjkYquS+ZmVs8kb0Rq2yIf/rnEf4l3qx/pV3scPh/ZT7ZN4h/rnEf4l3qx/pTscPh/Y7ZN4h/rnEf4l3qx/pTscPh/Y7ZN4jIpM4eIsNzMJB4r42W9LQD7V5dQwrwsem1syLruWRkZltHXfJub2OcC+he4cBtLD7xtHGsyppHQ5pmhpU9U2XLUpLFULZVOenvtNzJPe1a2G7LuhlYlrb1K4WmZhuqDKythjbFFO5rG6mtDWG2snaW32lQOponrpOTMnbUytTRRcie5rsoKqqlmbPKZA1jS0ENFiXEHuQFn10McbUVqWNChmfIq6S3LGWaaJAMq85McDjFTNEsg1Oee9tO4W1vPJYca0IKBz00n5J7lCeuaxdFma+xX1fllXzG7qmRo3RnsYHF2liem60WUsLdTfXMzn1UrtbvTIw48oKxpuKmcHzr/iV7WGNfxT0PCTSJ+S+pKMAzmVMRAqLTx8JsGyAcRFg7kI6VVloGOT7Ml9i1FXvav35p7lsYVicVTE2aFwcx3Dwg8II4CNyyJI3Mdou1msx7Xt0mmYvB7KPzp/OMnMj6q3aDcp1MOv33RCIlXCmdJ4R3iLzTOqFzD9peZ0zNlDLXk9BAEBCc7s4bQhvC+ZgHQHO/tV7D0vLfuQpV62it5lMLbMQmORmT/wC0wvfY6pS3VxNYfiqNTNoORPIvUsKPYq+ZdixDaKJzg5RftlSdE/IxXZHuPjP6SPQAt6kg+kzPWuswauf6j8tSE7zT4F2GnNS8dvP3PFENnrHtuTRVCvm0n6Cak/ZfoIdFmmutf0TtUC+EBzNVd2/nu95XTt1Icy7aU2+RHh9N50fFQ1W5dyJqXfNOglzx0BT+eTwyL7uP6ki2cO3a8zHxHeJyIEtAzyW4bm7rJ4mTMdDoyNDm6T3g2IuLgMOtU310bHK1b5f3vLjKGRzUclszJdmvr98B4g9/xYvP8hF5+n/p6/j5fIiOI0EkEjopWlj27Wm3KCCNRHGFbY9r26TdRTexzF0XJmfKCsfDIyaM2fG4ObyjgPEdh4ivr2o9qtXiGPVjkcnA6Qo6gSRskb3L2NeORwBHvXMuarVVFOla5HIioVfnp77TcyT3tWrhuy7oZeJa29SuFpmYSrB8gKuphZPG6EMeCRpPcDqJGsBh3b1UkrY43K1b5FuOike1HJbMnObzJGooZJXTGMh7GgaDnO1gk67tCoVlSyZERvAv0lM+JVVx5Z1cpnQRilidaSVt5HDa2PZYbi43HIDvX2gp0eum7Un7PNdOrE0G61/RUC2THJLk9kRV1jRIxrWRnY+QkB3NABJ5dQ41Vmq44lsua+RaipJJEumSeZtcRzXVcbS6N8cthraLscebfUekhRMxCNVsqWJX4fIiXatyDyMLSWuBBBIIIsQRqII4CryLfNChqyJTm6yiNJUtY4/IzEMeOAOOpr+Kx1HiJ3BVayBJGXTWhbo51jfZdSl5rBN0o/On84ycyPqrdoNynUw6/fdEIiVcKZ0nhHeIvNM6oXMP2l5nTM2UMteT0EAQFTZ48T0poqcHvbS9/OfqaOUNaT+Na+HR2ar+8ycRku5GdxXa0jNLvzW0XY8PYSLGVz5D0nRafVa1YVc/SmXyyN2iZowp55npnJxo01G4NNpJj2Jm8Ajt3dDb695C+UcX1JUvqTM+1kv04ltrXIpnA8ONTURQD6x4aSOBu1x6GgnoW1LJoMV3cYsUf1Ho3vOjYYmsaGNFmtAa0DYABYAdC5tVVVup0aJZLIftfD6EBzNVd2/nu95XTt1Icy7Wpt8iPD6bzo+Khqty7kTUu+adBLnjoCn88nhkX3cf1JFs4du15mPiO8TkQJaBnnQeRfgFL5hnVC5yp3ruanRU+6byQ3ShJimc74/85vHTs68i2sO3S8/gxcQ3vT5IOr5ROiMkvAaX7tF/TaucqN67mp0cG6byQr/PT32m5knvatDDdl3Qz8S1t6lcLTMwvrN183U/Nd13Ln6vfOOgpNy0karFg56yxrzPW1Eh2dkcxvNZ2jfYL9K6KmZoRNTy/Zz1S/TlcvmeWTOHCpq4YD3L5Bpc0Xc4eqCvU79CNXHmCP6kiNU6IjYGgNAAAFgBqAA2ADcubVbnRolj9ICnM72GNjqmTNFuzMOlxvYQCfVLPQtnD5FdGrV4f9MbEI9F6OTiQQrQKB0VkxXGekglO10TS7nWs72grm52aEjm+Z0kL9ONHeRUedP5xk5kfVWxQblOpj1++6IREq4UzpPCO8ReaZ1QuYftLzOmZsoZa8noIDFxOvZBE+aQ2YxpcfgBxk2A4yvTGK9yNTieXvRjVcpzvi2IPqJpJ391I4uPEOBo4gLDoXSRsRjUanA5yR6vcrl4n4w+jdPKyFndSPDR0m1+QbehfXvRjVcvA+MYr3I1OJ0fRUzYo2RN1NY1rW8jQAPcuac5XKqqdK1qNREQqHO7iPZKtsIOqGMXHlv7Y/l0FsYfHaPS7/8Ahj4g+8iN7j9Zn6HTq5JTsii1c55sPyh3pXzEX2jRvev6PuHsvIru5C4ljGwEAQHM1V3b+e73ldO3UhzLtam3yI8PpvOj4qGq3LuRNS75p0EueOgKfzyeGRfdx/UkWzh27XmY+I7xORAloGedB5F+AUvmGdULnKneu5qdFT7pvJDdKEmKazweHM+7s68i2sO3S8/gxcQ33T5IMr5ROiMkvAaX7tF1GrnKjeu5qdHBum8kK/z099puZJ72rQw3Zd0M/EtbepXC0zML6zdfN1PzXddy5+r3zjoKTctJGqxYOYi4nWdp1nlOtdScufWPINwSCNhBsfSF8VL6z6i21Ht+2y/aSeu7/K+aDe49abu9fUftsv2knru/ymg3uGm7vX1POWZzu6c51tmkSbelfURE1HlXKutT8L6fC9c2R/8Ajaf/ANvsmkCwK3fu6fpDeotw3r+yt86fzjJzI+qtOg3KdTNr990QiJVwpnSeEd4i80zqhcw/aXmdMzZQy15PQKApnOTlaKp/7PC68Ebrlw2SPGq43tHBvOvctqipvpppO1r7GNWVP1F0G6k9yEK+UCy80WT93OrXjULshvwnY946vS5ZeITZfTTqaeHw/wCxehaSyjVOdsq6nstbUv3zPA5GuLW+wBdHTt0Ymp5HO1DtKVy+ZYmZeACCok4XStb0NZcdcrOxJfuankaOHN+xV8yxVmmiEAQHM1V3b+e73ldO3UhzLtam3yI8PpvOj4qGq3LuRNS75p0EueOgKfzyeGRfdx/UkWzh27XmY+I7xORAloGedB5F+AUvmGdULnKneu5qdFT7pvJDdKEmKazweHM+7s68i2sO3S8/gxcQ33T5IMr5ROiMkvAaX7tF1GrnKjeu5qdHBum8kK/z099puZJ72rQw3Zd0M/EtbepXC0zML6zdfN1PzXddy5+r3zjoKTctJGqxYOa8TpuxTSxeJK9nquI+C6ZjtJqL3oc1I3Rcre5TMyVghkq4I5xeN79FwuW30gQ3WCCO2LV4nc5saq3We6drXSIjtRb/AO7zDfsD/Nm/Wsft0/i9k+DY7FB4fdfkfu8w37A/zZv1p26fxeyfA7FB4fdfkfu8w37A/wA2b9adun8XsnwOxQeH3X5H7vMN+wP82b9adun8XsnwOxQeH3X5N9heHRU0TYYW6Mbb6LbudbScXHW4k7SVXe9z3aTtZYYxrG6LdRTWdP5xk5kfVW1QblOpi1++6IREq4UzpPCO8ReaZ1QuYftLzOmZsoZE0rWNLnENa0XLiQAAOEk7F8RFVbIfVVES6lSZeZfGfSp6UkRbHybDJ5LdzPaeIbdelo9D736+7uMmqrNL7Gau/vK/WiZxvMkcnH104jbcMbYyv8Vu4eUdYHp4FBUTpC2/HgT08CzOtw4l+UdKyJjY42hrGNDWgcAGoLnnOVy3U6BrUalkPZfD6czVT9J73b3uPpJK6dqWREOZct3KpbeZo/8Ahyj/AOy7+nF/hZGI7xOX/VNfDt2vP4J8s8vhAEBzTXxlssjTtEjweUOIXTsW7UXyOZelnKnmbTIjw+m86Pioarcu5E1LvmnQS546Ap/PJ4ZF93H9SRbOHbteZj4jvE5ECWgZ50HkX4BS+YZ1Qucqd67mp0VPum8kN0oSYprPB4cz7uzryLaw7dLz+DFxDfdPkgyvlE6IyS8Bpfu0XUaucqN67mp0cG6byQgmemnN6aS2q0jCdx7QgdI0vQr+GrtJyKGJIv2rzKzWoZZZmQmXlPT0zaeo0mmO+i4NLg5pJcO51gi5GxZdVRve/TZxNSlrGMZoP4E3wHKilrHObA8uLAC67HN1E2G0KhLTyRJdyF6KdkuypWOdbBjDV9mA7ScXvwB7QA4dOp3SVq0EulHo8U/Rl18WjJpcFIUCRrGojYRqsrxRLZyXzlwuY1lYSyQADsgaXNfxkNF2u36rcmxY89A5FvHmnca8Fe1UtJkveSWTLXD2i5qY7cV3H0AXVZKWZfxLS1UKJfSQh+VWc0Fpiog651GZw0bDyGnXfjNrblcgoFveT0KU9elrR+pucgsuG1YEE5DagDUdglA4Rufvb0jhAhqqRY/ubq/RNS1aSfa7X+ybKiXik87ERbiDidjooyOQXb72rcoFvD1UxK9P8vQhpV0pHSeEd4i80zqhcw/aXmdMzZQqXOviczqt1OXnsTGsIYNTbloJJA7o8uzgWxQRtSPStmZFfI76mjfIg6vlA2+TOTk9dJoRCzR3yQjtWD4u3N4eIXKhmnbE27vQmhgfKtk9S9MAwWKjhEMQsBrc49093C5x4T/0FgSyuldpON6KJsbdFpslGSBAc04hFoyyN8WR7fQ4hdOxbtRfI5l6WcqeZZOZaq7Wpi3Fjx0gtPVb6VmYk3NrjTw12TmlmrLNMIAgKczm5LPhmfVRtJhkOk8gX7G891pbmk677yRuvtUVQjmoxdae5jVtOrXabUyU0GRHh9N50fFT1W5dyIKTfNOglzx0BT+eTwyL7uP6ki2cO3a8zHxHeJyIEtAzzoPIvwCl8wzqhc5U713NToqfdN5IbpQkxTWeDw5n3dnXkW1h26Xn8GLiG+6fJBlfKJ0Rkl4DS/douo1c5Ub13NTo4N03kh8yqwJtbTuhcbHumO26LxsPJrIPESkEyxP0kPk8KSs0VKFxfCpqWQxTMLHDZfY4b2u2OC345GyJdqmBJG6NbOQw1IeCxcy/fqjzbOsVm4lst5mlhu04sfKDBoqyF0Eo1HW1w2scNjhxj/I4VmRSuidpNNKWJsjdFxRuUmS9RROIkbdl+1laDoO3XP0TxH27VvQ1DJUy19xhTU74lz1d5pVOQBAfEBOMjMgp53tmm0oYgQ4bWyPI1jR4WDytu7eKFTWNYitbmvsXqajc5Uc7JPcuUBYptESzhZKGtia+K3Z4r6N9Qe07WE8B4Qd/LcXKSp+k6ztSlSrp/qtu3WhStdSSQuMcrHMeNrXAg+3aONbbXI5LtW5iOa5q2cljo3CO8ReaZ1QuaftLzOkZsoU3nOYXYk9rQSS2MAAEknQGoAbVtUK2gRV8zGrkVZrJ5Gfkvm1mlIkqrxR7dAd8dy8DB7eIbV4nr2tyZmvt/wCnuCgc7N+Sd3EtfDqCKCMRRMDGN2Ae87zxlZD3ueuk5czWYxrEs1MjJXk9BAEBz9lxSdir6lu+UvHJJaT+5dDSu0oWr5fo5+qbozOT+5mXm4xUU9dHpGzZQYnfiton1g30rzWR6cS24Znqjk0JU88i9lgG8EAQHwi+ooDTDJSiEzZ2wNZIx2k1zLsF95a0hp6Qp+0S6Oiq5EPZ49LSRMzdKAmNZimT9LUuD5oWyODdEF19QuTbbvJUrJpGJZq2I3wset3Jcw/9FYf/AA0ft/yvfapvEp47LD4UN1S0zImNjY0NY0BrWjYANgUDnK5bqTIiIlkPVfD6avE8naWoeHzQte4N0QXXvYEm23jKlZPIxLNWxE+GN63clzE/0Vh/8NH7f8r32qbxKeeyw+FDd00DY2NjYNFrWhrQNgaBYD0KBVVy3UmRERLIei+H08aqkjlboSMa9p+i9ocPQV9a5WrdFsfHNRyWVDUOyOw8/wC1i6G29ym7TN4lIuzReFDMwvA6amJdBEyMuFnFotcBeHyvftLc9MiYzZSxsVGSH5ewOBBAIO0HWD0ICO1uQuHym5p2tP8Axl0Y9VpA9istrJm/l65lZ1JC78f+GI3Nth4+g88Rkf8AAr32+bv9jz2GHu9zb4XktRU5BigYHDY4gvcORz7kKGSolftOJWU8bNlDcKEmCAIDxqqSOQaMjGvG57Q4egr61ytW6LY+OajksqHoxgAAAAAFgBqAA2ABfD6eLKKISOlDGiRwAc/RGkQBYDS224l603W0b5HnRS97ZmQvJ6CAIAgCAqbPHhmjNFUgant7G7nNuW+kE+qtfDpLtVnUycRjs5H9Cu1pGaXxkHlGK2mBcflo7NlHCTwP5HAX5bjgXP1UH0n5al1G/Sz/AFWeaaySqsWQgCAIAgCAIAgCAIAgCAIAgCAIAgCAIAgCAIAgCA+PcACSQANZJ1ABAaXDcqaaoqHU0LuyFrC9z29xqLW2DvpHtuDVxqd9O9jNN2RAyoY9+g1bm7UBOEAQBAEAQGnytwUVlLJD9IjSjO57dbeg7DxEqanl+lIjiGeL6rFac+Sxlri1wIc0kOB2gg2IPHddEioqXQ55UVFspsMn8alo5mzRHWNTmnY9vC0/54DZRzRNlbouJIZnRO0kL3yex2GsiEsR4ntPdMducPjwrAmhdE7Rcb0UrZW6TTaKIlCAIAgCAIAgCAIAgCAIAgCAIAgCAIAgCAIDyqalkbS+RzWNG1ziGgcpK+o1XLZD4qoiXUhOO5zqaK7adpnfv1sjH4iLu6BbjV6LD3uzfl+yjLXsbk3P9FbY/lTVVh+WkOhwRs7Vg/D9LlcSVpxU8cWynXiZstRJLtL04EhzO+Gyfd3deNV8R3Sc/ksYdvV5fBcaxTZCAIAgCAIAgKxzpZJk3rYW8Hy7RxfWAcmo9B3rUoan/W7p8GZXU1/8jevyVgtUyjNwjFZqWQSwvLXDbucPFcOEKOSNsjdFyEkcjo1u1S2sl84tPUWZPaCXZrPybj5Lz3PI70lZE9C9mbc09zXgrWPydkvsTUFUS6fUAQBAEAQBAEAQBAEAQBAEAQBAEB+ZJA0XcQANpJsB0lfUS+oKtiM4tl9QQXHZeyuH0YRp/m1N9qsx0cr+FuZVkrImcb8iFYxnTnfcU8bYh4zvlHcttTR7Vejw5iba3KUmIOXYSxCcSxOaodpzSPkPBpG4HINjehXmRtYlmpYovkc9buW5ir2eAgJ1md8Nk+7u68aoYjuk5/Jfw7ery+C41imyEAQBAEAQBAfCEBVGXeb8xl1RSNuza+EbWbywcLfJ4ODVs16Wtv8AZJr7/kyaqit90eru+CuVpGaEBu8Dyrq6SwilOgPq39uzoB7n8JCglpo5NpM+8niqZI9S5dxO8JzrRmwqIXMPjRnTby6JsR6Ss+TDnJsL6l+PEWrtpYluHZXUM9tCojufovPY3eh9iVUfTSs1tLbKmJ2pxumuB1jWFATn1AEAQBAEAQBAEAQHhVVsUQvJIxg3vc1o9pXprXO1Jc8q5G61NFW5dYfFtqGuO6MOk9rRb2qdtHM78fXIgdVwt/Ij1fnXhGqGCR/G8tjHs0j7lZZhrl2lt7ld+IsTZS5GcRzl10mphZCPIbpG3G59/YArTKCJuvMqvr5XasiLV+IzTm80r5D5bi63IDqCtMjazZSxVfI5+0tzGXs8BAEB8QErwDICsqbOc3sMfjSAgkeTHtPTYcaqS1sceSZr5fJbiopJM1yTz+C0slskKehu6PSdIW6LpHHWRcGwA1NFwOPjKyZ6l82S6u41YKZkWaa+8kKrlgIAgCAIAgCAIAgIXlbm/hqiZYbQzHWSB2jz5TRsPlDpBV2nrXR5OzQpVFG2TNuSlT41gVRSO0Z4y3XqdtY7mvGo8m3iWvFMyRLtUyZYXxrZyGuUpEEB8QHvSVksWuKR8fMe5nVIXlzGu2kuemvc3ZWxuKfLTEGbKl552i/rgqFaSFfxJkq5k/I2MOcrEG7XRu50Y/tIUS0EK9/qSpXy+RlMzp1o2xwH8Lx/evK4dF3r/eh6TEZe5D1Gdaq+xh/P+pef42PvU9fyL/CgOdaq+xh/P+pP42PvUfyL+5DyfnTrTsZAPwvP969Jh0Xev96Hn+Ql7kMaTOViB2OjbyRj4kr0lBD5+p5Wvl8jCmy6xF22pcOa2NvtDbqRKOFPx/ZGtZMv5fo1lTj1XJ3dRM7iMj7ei9lIkMbdTU9CNZpF1uX1NcRwqUiPqAIAgCA+IDY4XgdTUn5GF7/KAs31zZo9KifMxm0tiRkMj9lCbYNmqldZ1TKGDxI+2d0vOoHkBVGTEWpsJ6l6PDlXbX0J7gmStJSWMUQ0x9Y7t3+sdnRZUJaiSTaU0I6eOPZQ3SgJggCAIAgCAIAgCAIAgCA86inZI0se1rmnUWuAcDygr6iqi3Q+KiKllIPjebCmlu6BzoHeL3bPVJuOg24leixB7cnZ/soy0DHZtyINi2QFfBciPsrfGiOl+TU72FX462J/G3MoyUUrOF+RGZo3MJa4Frhta4FpHKCrSKipdCqqKmSn5X0+BAEAQBAEAQBAEAQBAfEBkUdFLKbRRvkPkNc/3BeXPa3aWx6axztlLkiw/N9iEv1QjG+Rwb+UXd7FWfWwt435FltFM7hbmSfDs0w2z1B5sTQPzuv1VVfiXhb6lpmHJ+TvQlmF5E0EFi2BrnD6Ul5Dy9tqHQAqclXK/WvpkW2UsTNSEgaANQVcsH1AEAQBAEAQBAEAQBAEAQBAEAQBAEBj1lDFMNGWNkg3Pa1w9BC9Ne5q3atjy5jXJZyXI9W5vsPk19h0Dvjc5v5b29isNrZm8b8yu6jhdwNJVZp4D3ueVvODX+7RVhuJP4tQgdhzOCqaufNNMO4qY3c5jm+4lSpiTeLSJcNdwca2qzaVjNZkgPI6T/8ANSNr414L7fJGtBInFPf4NZUZIVDNrouhz/0KVKpi9/8AepGtI9OKGGzApSbXZfld+le1naeEp3KtjPhyLqXWs6LXvc/9CjWrYnBf71JEo396f3obOnzY1j9fZKcDnSe7sajXEI04L7fJ7TD5F4p7/Bnw5ppj3VTGOaxzveQolxJvBpImGu4u9jYU+aaId8qXnmsaz36SjXEncGkjcObxcbalzZ0DO6bJJzpCOpZROr5l1ZdCZtBCmvM3VHkrQxW0KaK42EsDyPxOuVA6oldrcpM2nibqaht2tAFgLDcFCTH1AEAQBAEAQBAEAQBAEAQBAEB//9k="/>
+          <p:cNvSpPr>
+            <a:spLocks noChangeAspect="1" noChangeArrowheads="1"/>
+          </p:cNvSpPr>
+          <p:nvPr/>
+        </p:nvSpPr>
+        <p:spPr bwMode="auto">
+          <a:xfrm>
+            <a:off x="155575" y="-830263"/>
+            <a:ext cx="2628900" cy="1733551"/>
+          </a:xfrm>
+          <a:prstGeom prst="rect">
+            <a:avLst/>
+          </a:prstGeom>
+          <a:noFill/>
+          <a:extLst>
+            <a:ext uri="{909E8E84-426E-40DD-AFC4-6F175D3DCCD1}">
+              <a14:hiddenFill xmlns:a14="http://schemas.microsoft.com/office/drawing/2010/main">
+                <a:solidFill>
+                  <a:srgbClr val="FFFFFF"/>
+                </a:solidFill>
+              </a14:hiddenFill>
+            </a:ext>
+          </a:extLst>
+        </p:spPr>
+        <p:txBody>
+          <a:bodyPr vert="horz" wrap="square" lIns="91440" tIns="45720" rIns="91440" bIns="45720" numCol="1" anchor="t" anchorCtr="0" compatLnSpc="1">
+            <a:prstTxWarp prst="textNoShape">
+              <a:avLst/>
+            </a:prstTxWarp>
+          </a:bodyPr>
+          <a:lstStyle/>
+          <a:p>
+            <a:endParaRPr lang="de-DE"/>
+          </a:p>
+        </p:txBody>
+      </p:sp>
+      <p:pic>
+        <p:nvPicPr>
+          <p:cNvPr id="1028" name="Picture 4" descr="http://www.pctipp.ch/fileadmin/media/bilder/2008/26826.jpg"/>
+          <p:cNvPicPr>
+            <a:picLocks noChangeAspect="1" noChangeArrowheads="1"/>
+          </p:cNvPicPr>
+          <p:nvPr/>
+        </p:nvPicPr>
+        <p:blipFill>
+          <a:blip r:embed="rId4" cstate="print">
+            <a:extLst>
+              <a:ext uri="{28A0092B-C50C-407E-A947-70E740481C1C}">
+                <a14:useLocalDpi xmlns:a14="http://schemas.microsoft.com/office/drawing/2010/main" val="0"/>
+              </a:ext>
+            </a:extLst>
+          </a:blip>
+          <a:srcRect/>
+          <a:stretch>
+            <a:fillRect/>
+          </a:stretch>
+        </p:blipFill>
+        <p:spPr bwMode="auto">
+          <a:xfrm>
+            <a:off x="6966515" y="2828474"/>
+            <a:ext cx="1781949" cy="1176590"/>
+          </a:xfrm>
+          <a:prstGeom prst="rect">
+            <a:avLst/>
+          </a:prstGeom>
+          <a:noFill/>
+          <a:extLst>
+            <a:ext uri="{909E8E84-426E-40DD-AFC4-6F175D3DCCD1}">
+              <a14:hiddenFill xmlns:a14="http://schemas.microsoft.com/office/drawing/2010/main">
+                <a:solidFill>
+                  <a:srgbClr val="FFFFFF"/>
+                </a:solidFill>
+              </a14:hiddenFill>
+            </a:ext>
+          </a:extLst>
+        </p:spPr>
+      </p:pic>
+      <p:pic>
+        <p:nvPicPr>
+          <p:cNvPr id="1030" name="Picture 6" descr="http://www.geektech.in/wp-content/uploads/2012/01/01767636-photo-logo-amd-the-future-is-fusion.png"/>
+          <p:cNvPicPr>
+            <a:picLocks noChangeAspect="1" noChangeArrowheads="1"/>
+          </p:cNvPicPr>
+          <p:nvPr/>
+        </p:nvPicPr>
+        <p:blipFill rotWithShape="1">
+          <a:blip r:embed="rId5" cstate="print">
+            <a:extLst>
+              <a:ext uri="{28A0092B-C50C-407E-A947-70E740481C1C}">
+                <a14:useLocalDpi xmlns:a14="http://schemas.microsoft.com/office/drawing/2010/main" val="0"/>
+              </a:ext>
+            </a:extLst>
+          </a:blip>
+          <a:srcRect t="24821" b="27547"/>
+          <a:stretch/>
+        </p:blipFill>
+        <p:spPr bwMode="auto">
+          <a:xfrm>
+            <a:off x="6876256" y="4293096"/>
+            <a:ext cx="1890856" cy="900656"/>
+          </a:xfrm>
+          <a:prstGeom prst="rect">
+            <a:avLst/>
+          </a:prstGeom>
+          <a:noFill/>
+          <a:extLst>
+            <a:ext uri="{909E8E84-426E-40DD-AFC4-6F175D3DCCD1}">
+              <a14:hiddenFill xmlns:a14="http://schemas.microsoft.com/office/drawing/2010/main">
+                <a:solidFill>
+                  <a:srgbClr val="FFFFFF"/>
+                </a:solidFill>
+              </a14:hiddenFill>
+            </a:ext>
+          </a:extLst>
+        </p:spPr>
+      </p:pic>
+      <p:sp>
+        <p:nvSpPr>
+          <p:cNvPr id="5" name="AutoShape 8" descr="http://www.itespresso.de/wp-content/uploads/2011/01/nvidia-logo.png"/>
+          <p:cNvSpPr>
+            <a:spLocks noChangeAspect="1" noChangeArrowheads="1"/>
+          </p:cNvSpPr>
+          <p:nvPr/>
+        </p:nvSpPr>
+        <p:spPr bwMode="auto">
+          <a:xfrm>
+            <a:off x="155575" y="-144463"/>
+            <a:ext cx="304800" cy="304801"/>
+          </a:xfrm>
+          <a:prstGeom prst="rect">
+            <a:avLst/>
+          </a:prstGeom>
+          <a:noFill/>
+          <a:extLst>
+            <a:ext uri="{909E8E84-426E-40DD-AFC4-6F175D3DCCD1}">
+              <a14:hiddenFill xmlns:a14="http://schemas.microsoft.com/office/drawing/2010/main">
+                <a:solidFill>
+                  <a:srgbClr val="FFFFFF"/>
+                </a:solidFill>
+              </a14:hiddenFill>
+            </a:ext>
+          </a:extLst>
+        </p:spPr>
+        <p:txBody>
+          <a:bodyPr vert="horz" wrap="square" lIns="91440" tIns="45720" rIns="91440" bIns="45720" numCol="1" anchor="t" anchorCtr="0" compatLnSpc="1">
+            <a:prstTxWarp prst="textNoShape">
+              <a:avLst/>
+            </a:prstTxWarp>
+          </a:bodyPr>
+          <a:lstStyle/>
+          <a:p>
+            <a:endParaRPr lang="de-DE"/>
+          </a:p>
+        </p:txBody>
+      </p:sp>
+      <p:pic>
+        <p:nvPicPr>
+          <p:cNvPr id="1034" name="Picture 10" descr="nvidia-logo"/>
+          <p:cNvPicPr>
+            <a:picLocks noChangeAspect="1" noChangeArrowheads="1"/>
+          </p:cNvPicPr>
+          <p:nvPr/>
+        </p:nvPicPr>
+        <p:blipFill>
+          <a:blip r:embed="rId6">
+            <a:extLst>
+              <a:ext uri="{28A0092B-C50C-407E-A947-70E740481C1C}">
+                <a14:useLocalDpi xmlns:a14="http://schemas.microsoft.com/office/drawing/2010/main" val="0"/>
+              </a:ext>
+            </a:extLst>
+          </a:blip>
+          <a:srcRect/>
+          <a:stretch>
+            <a:fillRect/>
+          </a:stretch>
+        </p:blipFill>
+        <p:spPr bwMode="auto">
+          <a:xfrm>
+            <a:off x="6894507" y="1191320"/>
+            <a:ext cx="1896999" cy="1517600"/>
+          </a:xfrm>
+          <a:prstGeom prst="rect">
+            <a:avLst/>
+          </a:prstGeom>
+          <a:noFill/>
+          <a:extLst>
+            <a:ext uri="{909E8E84-426E-40DD-AFC4-6F175D3DCCD1}">
+              <a14:hiddenFill xmlns:a14="http://schemas.microsoft.com/office/drawing/2010/main">
+                <a:solidFill>
+                  <a:srgbClr val="FFFFFF"/>
+                </a:solidFill>
+              </a14:hiddenFill>
+            </a:ext>
+          </a:extLst>
+        </p:spPr>
+      </p:pic>
     </p:spTree>
     <p:extLst>
       <p:ext uri="{BB962C8B-B14F-4D97-AF65-F5344CB8AC3E}">
@@ -5697,11 +5946,7 @@
           <a:p>
             <a:r>
               <a:rPr lang="de-DE" dirty="0" smtClean="0"/>
-              <a:t>In jedem Pixel gewichtete Summe der Umliegenden </a:t>
-            </a:r>
-            <a:r>
-              <a:rPr lang="de-DE" dirty="0" smtClean="0"/>
-              <a:t>bilden</a:t>
+              <a:t>In jedem Pixel gewichtete Summe der Umliegenden bilden</a:t>
             </a:r>
             <a:endParaRPr lang="de-DE" dirty="0" smtClean="0">
               <a:solidFill>
@@ -5720,15 +5965,7 @@
                   <a:schemeClr val="tx1"/>
                 </a:solidFill>
               </a:rPr>
-              <a:t>Lässt </a:t>
-            </a:r>
-            <a:r>
-              <a:rPr lang="de-DE" dirty="0" smtClean="0">
-                <a:solidFill>
-                  <a:schemeClr val="tx1"/>
-                </a:solidFill>
-              </a:rPr>
-              <a:t>sich separieren in vertikalen &amp;</a:t>
+              <a:t>Lässt sich separieren in vertikalen &amp;</a:t>
             </a:r>
             <a:br>
               <a:rPr lang="de-DE" dirty="0" smtClean="0">
@@ -5766,11 +6003,7 @@
             </a:pPr>
             <a:r>
               <a:rPr lang="de-DE" dirty="0" smtClean="0"/>
-              <a:t>reduziert Zahl der Lesezugriffe </a:t>
-            </a:r>
-            <a:r>
-              <a:rPr lang="de-DE" dirty="0" smtClean="0"/>
-              <a:t>dramatisch!</a:t>
+              <a:t>reduziert Zahl der Lesezugriffe dramatisch!</a:t>
             </a:r>
             <a:endParaRPr lang="de-DE" dirty="0" smtClean="0">
               <a:solidFill>

</xml_diff>